<commit_message>
commit before going to the gym
</commit_message>
<xml_diff>
--- a/test3.pptx
+++ b/test3.pptx
@@ -3121,78 +3121,6 @@
           </a:p>
         </p:txBody>
       </p:sp>
-      <p:pic>
-        <p:nvPicPr>
-          <p:cNvPr id="3" name="Picture 2" descr="0.jpeg"/>
-          <p:cNvPicPr>
-            <a:picLocks noChangeAspect="1"/>
-          </p:cNvPicPr>
-          <p:nvPr/>
-        </p:nvPicPr>
-        <p:blipFill>
-          <a:blip r:embed="rId2"/>
-          <a:stretch>
-            <a:fillRect/>
-          </a:stretch>
-        </p:blipFill>
-        <p:spPr>
-          <a:xfrm>
-            <a:off x="1788300" y="591315"/>
-            <a:ext cx="2736613" cy="4871518"/>
-          </a:xfrm>
-          <a:prstGeom prst="rect">
-            <a:avLst/>
-          </a:prstGeom>
-        </p:spPr>
-      </p:pic>
-      <p:pic>
-        <p:nvPicPr>
-          <p:cNvPr id="4" name="Picture 3" descr="1.jpeg"/>
-          <p:cNvPicPr>
-            <a:picLocks noChangeAspect="1"/>
-          </p:cNvPicPr>
-          <p:nvPr/>
-        </p:nvPicPr>
-        <p:blipFill>
-          <a:blip r:embed="rId3"/>
-          <a:stretch>
-            <a:fillRect/>
-          </a:stretch>
-        </p:blipFill>
-        <p:spPr>
-          <a:xfrm>
-            <a:off x="4740749" y="591315"/>
-            <a:ext cx="2735602" cy="4871518"/>
-          </a:xfrm>
-          <a:prstGeom prst="rect">
-            <a:avLst/>
-          </a:prstGeom>
-        </p:spPr>
-      </p:pic>
-      <p:pic>
-        <p:nvPicPr>
-          <p:cNvPr id="5" name="Picture 4" descr="0.jpeg"/>
-          <p:cNvPicPr>
-            <a:picLocks noChangeAspect="1"/>
-          </p:cNvPicPr>
-          <p:nvPr/>
-        </p:nvPicPr>
-        <p:blipFill>
-          <a:blip r:embed="rId2"/>
-          <a:stretch>
-            <a:fillRect/>
-          </a:stretch>
-        </p:blipFill>
-        <p:spPr>
-          <a:xfrm>
-            <a:off x="7693199" y="591315"/>
-            <a:ext cx="2736613" cy="4871518"/>
-          </a:xfrm>
-          <a:prstGeom prst="rect">
-            <a:avLst/>
-          </a:prstGeom>
-        </p:spPr>
-      </p:pic>
     </p:spTree>
   </p:cSld>
   <p:clrMapOvr>

</xml_diff>